<commit_message>
code refactored. add some documentations. project finished.
</commit_message>
<xml_diff>
--- a/report/images/Presentation1.pptx
+++ b/report/images/Presentation1.pptx
@@ -5,12 +5,14 @@
     <p:sldMasterId id="2147483648" r:id="rId1"/>
   </p:sldMasterIdLst>
   <p:notesMasterIdLst>
-    <p:notesMasterId r:id="rId5"/>
+    <p:notesMasterId r:id="rId7"/>
   </p:notesMasterIdLst>
   <p:sldIdLst>
     <p:sldId id="256" r:id="rId2"/>
     <p:sldId id="257" r:id="rId3"/>
     <p:sldId id="258" r:id="rId4"/>
+    <p:sldId id="259" r:id="rId5"/>
+    <p:sldId id="260" r:id="rId6"/>
   </p:sldIdLst>
   <p:sldSz cx="9144000" cy="6858000" type="screen4x3"/>
   <p:notesSz cx="6858000" cy="9144000"/>
@@ -194,7 +196,7 @@
           <a:p>
             <a:fld id="{FF1CA607-09DE-E84F-B1C8-30DA9EBD2186}" type="datetimeFigureOut">
               <a:rPr lang="en-US" smtClean="0"/>
-              <a:t>5/17/15</a:t>
+              <a:t>5/18/15</a:t>
             </a:fld>
             <a:endParaRPr lang="en-US"/>
           </a:p>
@@ -727,7 +729,7 @@
           <a:p>
             <a:fld id="{3454AEC6-B015-DE4E-A030-978146A6C3FD}" type="datetimeFigureOut">
               <a:rPr lang="en-US" smtClean="0"/>
-              <a:t>5/17/15</a:t>
+              <a:t>5/18/15</a:t>
             </a:fld>
             <a:endParaRPr lang="en-US"/>
           </a:p>
@@ -897,7 +899,7 @@
           <a:p>
             <a:fld id="{3454AEC6-B015-DE4E-A030-978146A6C3FD}" type="datetimeFigureOut">
               <a:rPr lang="en-US" smtClean="0"/>
-              <a:t>5/17/15</a:t>
+              <a:t>5/18/15</a:t>
             </a:fld>
             <a:endParaRPr lang="en-US"/>
           </a:p>
@@ -1077,7 +1079,7 @@
           <a:p>
             <a:fld id="{3454AEC6-B015-DE4E-A030-978146A6C3FD}" type="datetimeFigureOut">
               <a:rPr lang="en-US" smtClean="0"/>
-              <a:t>5/17/15</a:t>
+              <a:t>5/18/15</a:t>
             </a:fld>
             <a:endParaRPr lang="en-US"/>
           </a:p>
@@ -1247,7 +1249,7 @@
           <a:p>
             <a:fld id="{3454AEC6-B015-DE4E-A030-978146A6C3FD}" type="datetimeFigureOut">
               <a:rPr lang="en-US" smtClean="0"/>
-              <a:t>5/17/15</a:t>
+              <a:t>5/18/15</a:t>
             </a:fld>
             <a:endParaRPr lang="en-US"/>
           </a:p>
@@ -1493,7 +1495,7 @@
           <a:p>
             <a:fld id="{3454AEC6-B015-DE4E-A030-978146A6C3FD}" type="datetimeFigureOut">
               <a:rPr lang="en-US" smtClean="0"/>
-              <a:t>5/17/15</a:t>
+              <a:t>5/18/15</a:t>
             </a:fld>
             <a:endParaRPr lang="en-US"/>
           </a:p>
@@ -1781,7 +1783,7 @@
           <a:p>
             <a:fld id="{3454AEC6-B015-DE4E-A030-978146A6C3FD}" type="datetimeFigureOut">
               <a:rPr lang="en-US" smtClean="0"/>
-              <a:t>5/17/15</a:t>
+              <a:t>5/18/15</a:t>
             </a:fld>
             <a:endParaRPr lang="en-US"/>
           </a:p>
@@ -2203,7 +2205,7 @@
           <a:p>
             <a:fld id="{3454AEC6-B015-DE4E-A030-978146A6C3FD}" type="datetimeFigureOut">
               <a:rPr lang="en-US" smtClean="0"/>
-              <a:t>5/17/15</a:t>
+              <a:t>5/18/15</a:t>
             </a:fld>
             <a:endParaRPr lang="en-US"/>
           </a:p>
@@ -2321,7 +2323,7 @@
           <a:p>
             <a:fld id="{3454AEC6-B015-DE4E-A030-978146A6C3FD}" type="datetimeFigureOut">
               <a:rPr lang="en-US" smtClean="0"/>
-              <a:t>5/17/15</a:t>
+              <a:t>5/18/15</a:t>
             </a:fld>
             <a:endParaRPr lang="en-US"/>
           </a:p>
@@ -2416,7 +2418,7 @@
           <a:p>
             <a:fld id="{3454AEC6-B015-DE4E-A030-978146A6C3FD}" type="datetimeFigureOut">
               <a:rPr lang="en-US" smtClean="0"/>
-              <a:t>5/17/15</a:t>
+              <a:t>5/18/15</a:t>
             </a:fld>
             <a:endParaRPr lang="en-US"/>
           </a:p>
@@ -2693,7 +2695,7 @@
           <a:p>
             <a:fld id="{3454AEC6-B015-DE4E-A030-978146A6C3FD}" type="datetimeFigureOut">
               <a:rPr lang="en-US" smtClean="0"/>
-              <a:t>5/17/15</a:t>
+              <a:t>5/18/15</a:t>
             </a:fld>
             <a:endParaRPr lang="en-US"/>
           </a:p>
@@ -2946,7 +2948,7 @@
           <a:p>
             <a:fld id="{3454AEC6-B015-DE4E-A030-978146A6C3FD}" type="datetimeFigureOut">
               <a:rPr lang="en-US" smtClean="0"/>
-              <a:t>5/17/15</a:t>
+              <a:t>5/18/15</a:t>
             </a:fld>
             <a:endParaRPr lang="en-US"/>
           </a:p>
@@ -3159,7 +3161,7 @@
           <a:p>
             <a:fld id="{3454AEC6-B015-DE4E-A030-978146A6C3FD}" type="datetimeFigureOut">
               <a:rPr lang="en-US" smtClean="0"/>
-              <a:t>5/17/15</a:t>
+              <a:t>5/18/15</a:t>
             </a:fld>
             <a:endParaRPr lang="en-US"/>
           </a:p>
@@ -3662,36 +3664,6 @@
           </a:prstGeom>
         </p:spPr>
       </p:pic>
-      <p:pic>
-        <p:nvPicPr>
-          <p:cNvPr id="6" name="Picture 5" descr="Leap_Palm_Vectors.png"/>
-          <p:cNvPicPr>
-            <a:picLocks noChangeAspect="1"/>
-          </p:cNvPicPr>
-          <p:nvPr/>
-        </p:nvPicPr>
-        <p:blipFill>
-          <a:blip r:embed="rId4">
-            <a:extLst>
-              <a:ext uri="{28A0092B-C50C-407E-A947-70E740481C1C}">
-                <a14:useLocalDpi xmlns:a14="http://schemas.microsoft.com/office/drawing/2010/main" val="0"/>
-              </a:ext>
-            </a:extLst>
-          </a:blip>
-          <a:stretch>
-            <a:fillRect/>
-          </a:stretch>
-        </p:blipFill>
-        <p:spPr>
-          <a:xfrm>
-            <a:off x="7947806" y="2554111"/>
-            <a:ext cx="3256291" cy="1497894"/>
-          </a:xfrm>
-          <a:prstGeom prst="rect">
-            <a:avLst/>
-          </a:prstGeom>
-        </p:spPr>
-      </p:pic>
       <p:sp>
         <p:nvSpPr>
           <p:cNvPr id="7" name="TextBox 6"/>
@@ -3798,78 +3770,123 @@
           </a:p>
         </p:txBody>
       </p:sp>
-      <p:pic>
-        <p:nvPicPr>
-          <p:cNvPr id="10" name="Picture 9"/>
-          <p:cNvPicPr>
-            <a:picLocks noChangeAspect="1"/>
-          </p:cNvPicPr>
+      <p:grpSp>
+        <p:nvGrpSpPr>
+          <p:cNvPr id="2" name="Group 1"/>
+          <p:cNvGrpSpPr/>
           <p:nvPr/>
-        </p:nvPicPr>
-        <p:blipFill>
-          <a:blip r:embed="rId5"/>
-          <a:stretch>
-            <a:fillRect/>
-          </a:stretch>
-        </p:blipFill>
-        <p:spPr>
+        </p:nvGrpSpPr>
+        <p:grpSpPr>
           <a:xfrm>
-            <a:off x="8915400" y="3653366"/>
-            <a:ext cx="190500" cy="215900"/>
-          </a:xfrm>
-          <a:prstGeom prst="rect">
-            <a:avLst/>
-          </a:prstGeom>
-        </p:spPr>
-      </p:pic>
-      <p:pic>
-        <p:nvPicPr>
-          <p:cNvPr id="12" name="Picture 11"/>
-          <p:cNvPicPr>
-            <a:picLocks noChangeAspect="1"/>
-          </p:cNvPicPr>
-          <p:nvPr/>
-        </p:nvPicPr>
-        <p:blipFill>
-          <a:blip r:embed="rId6"/>
-          <a:stretch>
-            <a:fillRect/>
-          </a:stretch>
-        </p:blipFill>
-        <p:spPr>
-          <a:xfrm>
-            <a:off x="9965266" y="3640666"/>
-            <a:ext cx="177800" cy="228600"/>
-          </a:xfrm>
-          <a:prstGeom prst="rect">
-            <a:avLst/>
-          </a:prstGeom>
-        </p:spPr>
-      </p:pic>
-      <p:pic>
-        <p:nvPicPr>
-          <p:cNvPr id="14" name="Picture 13"/>
-          <p:cNvPicPr>
-            <a:picLocks noChangeAspect="1"/>
-          </p:cNvPicPr>
-          <p:nvPr/>
-        </p:nvPicPr>
-        <p:blipFill>
-          <a:blip r:embed="rId7"/>
-          <a:stretch>
-            <a:fillRect/>
-          </a:stretch>
-        </p:blipFill>
-        <p:spPr>
-          <a:xfrm>
-            <a:off x="8915400" y="4223456"/>
-            <a:ext cx="1346200" cy="292100"/>
-          </a:xfrm>
-          <a:prstGeom prst="rect">
-            <a:avLst/>
-          </a:prstGeom>
-        </p:spPr>
-      </p:pic>
+            <a:off x="7947806" y="2554111"/>
+            <a:ext cx="3256291" cy="1961445"/>
+            <a:chOff x="7947806" y="2554111"/>
+            <a:chExt cx="3256291" cy="1961445"/>
+          </a:xfrm>
+        </p:grpSpPr>
+        <p:pic>
+          <p:nvPicPr>
+            <p:cNvPr id="6" name="Picture 5" descr="Leap_Palm_Vectors.png"/>
+            <p:cNvPicPr>
+              <a:picLocks noChangeAspect="1"/>
+            </p:cNvPicPr>
+            <p:nvPr/>
+          </p:nvPicPr>
+          <p:blipFill>
+            <a:blip r:embed="rId4">
+              <a:extLst>
+                <a:ext uri="{28A0092B-C50C-407E-A947-70E740481C1C}">
+                  <a14:useLocalDpi xmlns:a14="http://schemas.microsoft.com/office/drawing/2010/main" val="0"/>
+                </a:ext>
+              </a:extLst>
+            </a:blip>
+            <a:stretch>
+              <a:fillRect/>
+            </a:stretch>
+          </p:blipFill>
+          <p:spPr>
+            <a:xfrm>
+              <a:off x="7947806" y="2554111"/>
+              <a:ext cx="3256291" cy="1497894"/>
+            </a:xfrm>
+            <a:prstGeom prst="rect">
+              <a:avLst/>
+            </a:prstGeom>
+          </p:spPr>
+        </p:pic>
+        <p:pic>
+          <p:nvPicPr>
+            <p:cNvPr id="10" name="Picture 9"/>
+            <p:cNvPicPr>
+              <a:picLocks noChangeAspect="1"/>
+            </p:cNvPicPr>
+            <p:nvPr/>
+          </p:nvPicPr>
+          <p:blipFill>
+            <a:blip r:embed="rId5"/>
+            <a:stretch>
+              <a:fillRect/>
+            </a:stretch>
+          </p:blipFill>
+          <p:spPr>
+            <a:xfrm>
+              <a:off x="8915400" y="3653366"/>
+              <a:ext cx="190500" cy="215900"/>
+            </a:xfrm>
+            <a:prstGeom prst="rect">
+              <a:avLst/>
+            </a:prstGeom>
+          </p:spPr>
+        </p:pic>
+        <p:pic>
+          <p:nvPicPr>
+            <p:cNvPr id="12" name="Picture 11"/>
+            <p:cNvPicPr>
+              <a:picLocks noChangeAspect="1"/>
+            </p:cNvPicPr>
+            <p:nvPr/>
+          </p:nvPicPr>
+          <p:blipFill>
+            <a:blip r:embed="rId6"/>
+            <a:stretch>
+              <a:fillRect/>
+            </a:stretch>
+          </p:blipFill>
+          <p:spPr>
+            <a:xfrm>
+              <a:off x="9965266" y="3640666"/>
+              <a:ext cx="177800" cy="228600"/>
+            </a:xfrm>
+            <a:prstGeom prst="rect">
+              <a:avLst/>
+            </a:prstGeom>
+          </p:spPr>
+        </p:pic>
+        <p:pic>
+          <p:nvPicPr>
+            <p:cNvPr id="14" name="Picture 13"/>
+            <p:cNvPicPr>
+              <a:picLocks noChangeAspect="1"/>
+            </p:cNvPicPr>
+            <p:nvPr/>
+          </p:nvPicPr>
+          <p:blipFill>
+            <a:blip r:embed="rId7"/>
+            <a:stretch>
+              <a:fillRect/>
+            </a:stretch>
+          </p:blipFill>
+          <p:spPr>
+            <a:xfrm>
+              <a:off x="8915400" y="4223456"/>
+              <a:ext cx="1346200" cy="292100"/>
+            </a:xfrm>
+            <a:prstGeom prst="rect">
+              <a:avLst/>
+            </a:prstGeom>
+          </p:spPr>
+        </p:pic>
+      </p:grpSp>
     </p:spTree>
     <p:extLst>
       <p:ext uri="{BB962C8B-B14F-4D97-AF65-F5344CB8AC3E}">
@@ -4809,6 +4826,1059 @@
     <p:extLst>
       <p:ext uri="{BB962C8B-B14F-4D97-AF65-F5344CB8AC3E}">
         <p14:creationId xmlns:p14="http://schemas.microsoft.com/office/powerpoint/2010/main" val="44483261"/>
+      </p:ext>
+    </p:extLst>
+  </p:cSld>
+  <p:clrMapOvr>
+    <a:masterClrMapping/>
+  </p:clrMapOvr>
+</p:sld>
+</file>
+
+<file path=ppt/slides/slide4.xml><?xml version="1.0" encoding="utf-8"?>
+<p:sld xmlns:a="http://schemas.openxmlformats.org/drawingml/2006/main" xmlns:r="http://schemas.openxmlformats.org/officeDocument/2006/relationships" xmlns:p="http://schemas.openxmlformats.org/presentationml/2006/main">
+  <p:cSld>
+    <p:spTree>
+      <p:nvGrpSpPr>
+        <p:cNvPr id="1" name=""/>
+        <p:cNvGrpSpPr/>
+        <p:nvPr/>
+      </p:nvGrpSpPr>
+      <p:grpSpPr>
+        <a:xfrm>
+          <a:off x="0" y="0"/>
+          <a:ext cx="0" cy="0"/>
+          <a:chOff x="0" y="0"/>
+          <a:chExt cx="0" cy="0"/>
+        </a:xfrm>
+      </p:grpSpPr>
+      <p:sp>
+        <p:nvSpPr>
+          <p:cNvPr id="4" name="Oval 3"/>
+          <p:cNvSpPr/>
+          <p:nvPr/>
+        </p:nvSpPr>
+        <p:spPr>
+          <a:xfrm>
+            <a:off x="1047750" y="2878668"/>
+            <a:ext cx="857249" cy="857249"/>
+          </a:xfrm>
+          <a:prstGeom prst="ellipse">
+            <a:avLst/>
+          </a:prstGeom>
+          <a:solidFill>
+            <a:schemeClr val="tx2">
+              <a:lumMod val="40000"/>
+              <a:lumOff val="60000"/>
+            </a:schemeClr>
+          </a:solidFill>
+          <a:ln>
+            <a:solidFill>
+              <a:schemeClr val="tx1"/>
+            </a:solidFill>
+          </a:ln>
+          <a:effectLst/>
+        </p:spPr>
+        <p:style>
+          <a:lnRef idx="1">
+            <a:schemeClr val="accent1"/>
+          </a:lnRef>
+          <a:fillRef idx="3">
+            <a:schemeClr val="accent1"/>
+          </a:fillRef>
+          <a:effectRef idx="2">
+            <a:schemeClr val="accent1"/>
+          </a:effectRef>
+          <a:fontRef idx="minor">
+            <a:schemeClr val="lt1"/>
+          </a:fontRef>
+        </p:style>
+        <p:txBody>
+          <a:bodyPr rtlCol="0" anchor="ctr"/>
+          <a:lstStyle/>
+          <a:p>
+            <a:pPr algn="ctr"/>
+            <a:endParaRPr lang="en-US"/>
+          </a:p>
+        </p:txBody>
+      </p:sp>
+      <p:sp>
+        <p:nvSpPr>
+          <p:cNvPr id="5" name="Rectangle 4"/>
+          <p:cNvSpPr/>
+          <p:nvPr/>
+        </p:nvSpPr>
+        <p:spPr>
+          <a:xfrm>
+            <a:off x="2540001" y="2878668"/>
+            <a:ext cx="857250" cy="857250"/>
+          </a:xfrm>
+          <a:prstGeom prst="rect">
+            <a:avLst/>
+          </a:prstGeom>
+          <a:solidFill>
+            <a:schemeClr val="tx2">
+              <a:lumMod val="40000"/>
+              <a:lumOff val="60000"/>
+            </a:schemeClr>
+          </a:solidFill>
+          <a:ln>
+            <a:solidFill>
+              <a:schemeClr val="tx1"/>
+            </a:solidFill>
+          </a:ln>
+          <a:effectLst/>
+        </p:spPr>
+        <p:style>
+          <a:lnRef idx="1">
+            <a:schemeClr val="accent1"/>
+          </a:lnRef>
+          <a:fillRef idx="3">
+            <a:schemeClr val="accent1"/>
+          </a:fillRef>
+          <a:effectRef idx="2">
+            <a:schemeClr val="accent1"/>
+          </a:effectRef>
+          <a:fontRef idx="minor">
+            <a:schemeClr val="lt1"/>
+          </a:fontRef>
+        </p:style>
+        <p:txBody>
+          <a:bodyPr rtlCol="0" anchor="ctr"/>
+          <a:lstStyle/>
+          <a:p>
+            <a:pPr algn="ctr"/>
+            <a:endParaRPr lang="en-US"/>
+          </a:p>
+        </p:txBody>
+      </p:sp>
+      <p:sp>
+        <p:nvSpPr>
+          <p:cNvPr id="6" name="Diamond 5"/>
+          <p:cNvSpPr/>
+          <p:nvPr/>
+        </p:nvSpPr>
+        <p:spPr>
+          <a:xfrm>
+            <a:off x="4035792" y="2566301"/>
+            <a:ext cx="624417" cy="1280583"/>
+          </a:xfrm>
+          <a:prstGeom prst="diamond">
+            <a:avLst/>
+          </a:prstGeom>
+          <a:solidFill>
+            <a:schemeClr val="tx2">
+              <a:lumMod val="40000"/>
+              <a:lumOff val="60000"/>
+            </a:schemeClr>
+          </a:solidFill>
+          <a:ln>
+            <a:solidFill>
+              <a:schemeClr val="tx1"/>
+            </a:solidFill>
+          </a:ln>
+          <a:effectLst/>
+        </p:spPr>
+        <p:style>
+          <a:lnRef idx="1">
+            <a:schemeClr val="accent1"/>
+          </a:lnRef>
+          <a:fillRef idx="3">
+            <a:schemeClr val="accent1"/>
+          </a:fillRef>
+          <a:effectRef idx="2">
+            <a:schemeClr val="accent1"/>
+          </a:effectRef>
+          <a:fontRef idx="minor">
+            <a:schemeClr val="lt1"/>
+          </a:fontRef>
+        </p:style>
+        <p:txBody>
+          <a:bodyPr rtlCol="0" anchor="ctr"/>
+          <a:lstStyle/>
+          <a:p>
+            <a:pPr algn="ctr"/>
+            <a:endParaRPr lang="en-US"/>
+          </a:p>
+        </p:txBody>
+      </p:sp>
+      <p:grpSp>
+        <p:nvGrpSpPr>
+          <p:cNvPr id="9" name="Group 8"/>
+          <p:cNvGrpSpPr/>
+          <p:nvPr/>
+        </p:nvGrpSpPr>
+        <p:grpSpPr>
+          <a:xfrm>
+            <a:off x="6124657" y="2554632"/>
+            <a:ext cx="357960" cy="1437347"/>
+            <a:chOff x="6773333" y="2667000"/>
+            <a:chExt cx="687917" cy="2762251"/>
+          </a:xfrm>
+          <a:solidFill>
+            <a:schemeClr val="tx2">
+              <a:lumMod val="40000"/>
+              <a:lumOff val="60000"/>
+            </a:schemeClr>
+          </a:solidFill>
+          <a:effectLst/>
+        </p:grpSpPr>
+        <p:sp>
+          <p:nvSpPr>
+            <p:cNvPr id="7" name="Isosceles Triangle 6"/>
+            <p:cNvSpPr/>
+            <p:nvPr/>
+          </p:nvSpPr>
+          <p:spPr>
+            <a:xfrm>
+              <a:off x="6773333" y="2667000"/>
+              <a:ext cx="687917" cy="687917"/>
+            </a:xfrm>
+            <a:prstGeom prst="triangle">
+              <a:avLst/>
+            </a:prstGeom>
+            <a:grpFill/>
+            <a:ln>
+              <a:solidFill>
+                <a:schemeClr val="tx1"/>
+              </a:solidFill>
+            </a:ln>
+          </p:spPr>
+          <p:style>
+            <a:lnRef idx="1">
+              <a:schemeClr val="accent1"/>
+            </a:lnRef>
+            <a:fillRef idx="3">
+              <a:schemeClr val="accent1"/>
+            </a:fillRef>
+            <a:effectRef idx="2">
+              <a:schemeClr val="accent1"/>
+            </a:effectRef>
+            <a:fontRef idx="minor">
+              <a:schemeClr val="lt1"/>
+            </a:fontRef>
+          </p:style>
+          <p:txBody>
+            <a:bodyPr rtlCol="0" anchor="ctr"/>
+            <a:lstStyle/>
+            <a:p>
+              <a:pPr algn="ctr"/>
+              <a:endParaRPr lang="en-US"/>
+            </a:p>
+          </p:txBody>
+        </p:sp>
+        <p:sp>
+          <p:nvSpPr>
+            <p:cNvPr id="8" name="Isosceles Triangle 7"/>
+            <p:cNvSpPr/>
+            <p:nvPr/>
+          </p:nvSpPr>
+          <p:spPr>
+            <a:xfrm flipV="1">
+              <a:off x="6773333" y="3354917"/>
+              <a:ext cx="687917" cy="2074334"/>
+            </a:xfrm>
+            <a:prstGeom prst="triangle">
+              <a:avLst/>
+            </a:prstGeom>
+            <a:grpFill/>
+            <a:ln>
+              <a:solidFill>
+                <a:schemeClr val="tx1"/>
+              </a:solidFill>
+            </a:ln>
+          </p:spPr>
+          <p:style>
+            <a:lnRef idx="1">
+              <a:schemeClr val="accent1"/>
+            </a:lnRef>
+            <a:fillRef idx="3">
+              <a:schemeClr val="accent1"/>
+            </a:fillRef>
+            <a:effectRef idx="2">
+              <a:schemeClr val="accent1"/>
+            </a:effectRef>
+            <a:fontRef idx="minor">
+              <a:schemeClr val="lt1"/>
+            </a:fontRef>
+          </p:style>
+          <p:txBody>
+            <a:bodyPr rtlCol="0" anchor="ctr"/>
+            <a:lstStyle/>
+            <a:p>
+              <a:pPr algn="ctr"/>
+              <a:endParaRPr lang="en-US"/>
+            </a:p>
+          </p:txBody>
+        </p:sp>
+      </p:grpSp>
+      <p:sp>
+        <p:nvSpPr>
+          <p:cNvPr id="10" name="TextBox 9"/>
+          <p:cNvSpPr txBox="1"/>
+          <p:nvPr/>
+        </p:nvSpPr>
+        <p:spPr>
+          <a:xfrm>
+            <a:off x="948938" y="3995208"/>
+            <a:ext cx="1031352" cy="369332"/>
+          </a:xfrm>
+          <a:prstGeom prst="rect">
+            <a:avLst/>
+          </a:prstGeom>
+          <a:noFill/>
+        </p:spPr>
+        <p:txBody>
+          <a:bodyPr wrap="none" rtlCol="0">
+            <a:spAutoFit/>
+          </a:bodyPr>
+          <a:lstStyle/>
+          <a:p>
+            <a:r>
+              <a:rPr lang="en-US" dirty="0" smtClean="0">
+                <a:latin typeface="Arial"/>
+                <a:cs typeface="Arial"/>
+              </a:rPr>
+              <a:t>Cylinder</a:t>
+            </a:r>
+            <a:endParaRPr lang="en-US" dirty="0">
+              <a:latin typeface="Arial"/>
+              <a:cs typeface="Arial"/>
+            </a:endParaRPr>
+          </a:p>
+        </p:txBody>
+      </p:sp>
+      <p:sp>
+        <p:nvSpPr>
+          <p:cNvPr id="11" name="TextBox 10"/>
+          <p:cNvSpPr txBox="1"/>
+          <p:nvPr/>
+        </p:nvSpPr>
+        <p:spPr>
+          <a:xfrm>
+            <a:off x="2468241" y="3989916"/>
+            <a:ext cx="929010" cy="369332"/>
+          </a:xfrm>
+          <a:prstGeom prst="rect">
+            <a:avLst/>
+          </a:prstGeom>
+          <a:noFill/>
+        </p:spPr>
+        <p:txBody>
+          <a:bodyPr wrap="none" rtlCol="0">
+            <a:spAutoFit/>
+          </a:bodyPr>
+          <a:lstStyle/>
+          <a:p>
+            <a:r>
+              <a:rPr lang="en-US" dirty="0" smtClean="0">
+                <a:latin typeface="Arial"/>
+                <a:cs typeface="Arial"/>
+              </a:rPr>
+              <a:t>Square</a:t>
+            </a:r>
+            <a:endParaRPr lang="en-US" dirty="0">
+              <a:latin typeface="Arial"/>
+              <a:cs typeface="Arial"/>
+            </a:endParaRPr>
+          </a:p>
+        </p:txBody>
+      </p:sp>
+      <p:sp>
+        <p:nvSpPr>
+          <p:cNvPr id="12" name="TextBox 11"/>
+          <p:cNvSpPr txBox="1"/>
+          <p:nvPr/>
+        </p:nvSpPr>
+        <p:spPr>
+          <a:xfrm>
+            <a:off x="3937672" y="3995208"/>
+            <a:ext cx="838954" cy="369332"/>
+          </a:xfrm>
+          <a:prstGeom prst="rect">
+            <a:avLst/>
+          </a:prstGeom>
+          <a:noFill/>
+        </p:spPr>
+        <p:txBody>
+          <a:bodyPr wrap="none" rtlCol="0">
+            <a:spAutoFit/>
+          </a:bodyPr>
+          <a:lstStyle/>
+          <a:p>
+            <a:r>
+              <a:rPr lang="en-US" dirty="0" smtClean="0">
+                <a:latin typeface="Arial"/>
+                <a:cs typeface="Arial"/>
+              </a:rPr>
+              <a:t>Sword</a:t>
+            </a:r>
+            <a:endParaRPr lang="en-US" dirty="0">
+              <a:latin typeface="Arial"/>
+              <a:cs typeface="Arial"/>
+            </a:endParaRPr>
+          </a:p>
+        </p:txBody>
+      </p:sp>
+      <p:sp>
+        <p:nvSpPr>
+          <p:cNvPr id="13" name="TextBox 12"/>
+          <p:cNvSpPr txBox="1"/>
+          <p:nvPr/>
+        </p:nvSpPr>
+        <p:spPr>
+          <a:xfrm>
+            <a:off x="5187822" y="3991979"/>
+            <a:ext cx="2057787" cy="369332"/>
+          </a:xfrm>
+          <a:prstGeom prst="rect">
+            <a:avLst/>
+          </a:prstGeom>
+          <a:noFill/>
+        </p:spPr>
+        <p:txBody>
+          <a:bodyPr wrap="none" rtlCol="0">
+            <a:spAutoFit/>
+          </a:bodyPr>
+          <a:lstStyle/>
+          <a:p>
+            <a:r>
+              <a:rPr lang="en-US" dirty="0" smtClean="0">
+                <a:latin typeface="Arial"/>
+                <a:cs typeface="Arial"/>
+              </a:rPr>
+              <a:t>Anisotropic Sword</a:t>
+            </a:r>
+            <a:endParaRPr lang="en-US" dirty="0">
+              <a:latin typeface="Arial"/>
+              <a:cs typeface="Arial"/>
+            </a:endParaRPr>
+          </a:p>
+        </p:txBody>
+      </p:sp>
+      <p:cxnSp>
+        <p:nvCxnSpPr>
+          <p:cNvPr id="15" name="Straight Arrow Connector 14"/>
+          <p:cNvCxnSpPr/>
+          <p:nvPr/>
+        </p:nvCxnSpPr>
+        <p:spPr>
+          <a:xfrm flipV="1">
+            <a:off x="1047750" y="2476500"/>
+            <a:ext cx="857249" cy="10583"/>
+          </a:xfrm>
+          <a:prstGeom prst="straightConnector1">
+            <a:avLst/>
+          </a:prstGeom>
+          <a:ln w="19050">
+            <a:solidFill>
+              <a:schemeClr val="tx1"/>
+            </a:solidFill>
+            <a:headEnd type="arrow"/>
+            <a:tailEnd type="arrow"/>
+          </a:ln>
+          <a:effectLst/>
+        </p:spPr>
+        <p:style>
+          <a:lnRef idx="2">
+            <a:schemeClr val="accent1"/>
+          </a:lnRef>
+          <a:fillRef idx="0">
+            <a:schemeClr val="accent1"/>
+          </a:fillRef>
+          <a:effectRef idx="1">
+            <a:schemeClr val="accent1"/>
+          </a:effectRef>
+          <a:fontRef idx="minor">
+            <a:schemeClr val="tx1"/>
+          </a:fontRef>
+        </p:style>
+      </p:cxnSp>
+      <p:sp>
+        <p:nvSpPr>
+          <p:cNvPr id="16" name="TextBox 15"/>
+          <p:cNvSpPr txBox="1"/>
+          <p:nvPr/>
+        </p:nvSpPr>
+        <p:spPr>
+          <a:xfrm>
+            <a:off x="1174750" y="2069584"/>
+            <a:ext cx="583663" cy="369332"/>
+          </a:xfrm>
+          <a:prstGeom prst="rect">
+            <a:avLst/>
+          </a:prstGeom>
+          <a:noFill/>
+        </p:spPr>
+        <p:txBody>
+          <a:bodyPr wrap="none" rtlCol="0">
+            <a:spAutoFit/>
+          </a:bodyPr>
+          <a:lstStyle/>
+          <a:p>
+            <a:r>
+              <a:rPr lang="en-US" dirty="0" smtClean="0"/>
+              <a:t>5cm</a:t>
+            </a:r>
+            <a:endParaRPr lang="en-US" dirty="0"/>
+          </a:p>
+        </p:txBody>
+      </p:sp>
+      <p:cxnSp>
+        <p:nvCxnSpPr>
+          <p:cNvPr id="17" name="Straight Arrow Connector 16"/>
+          <p:cNvCxnSpPr/>
+          <p:nvPr/>
+        </p:nvCxnSpPr>
+        <p:spPr>
+          <a:xfrm flipV="1">
+            <a:off x="2540002" y="2487083"/>
+            <a:ext cx="857249" cy="10583"/>
+          </a:xfrm>
+          <a:prstGeom prst="straightConnector1">
+            <a:avLst/>
+          </a:prstGeom>
+          <a:ln w="19050">
+            <a:solidFill>
+              <a:schemeClr val="tx1"/>
+            </a:solidFill>
+            <a:headEnd type="arrow"/>
+            <a:tailEnd type="arrow"/>
+          </a:ln>
+          <a:effectLst/>
+        </p:spPr>
+        <p:style>
+          <a:lnRef idx="2">
+            <a:schemeClr val="accent1"/>
+          </a:lnRef>
+          <a:fillRef idx="0">
+            <a:schemeClr val="accent1"/>
+          </a:fillRef>
+          <a:effectRef idx="1">
+            <a:schemeClr val="accent1"/>
+          </a:effectRef>
+          <a:fontRef idx="minor">
+            <a:schemeClr val="tx1"/>
+          </a:fontRef>
+        </p:style>
+      </p:cxnSp>
+      <p:sp>
+        <p:nvSpPr>
+          <p:cNvPr id="18" name="TextBox 17"/>
+          <p:cNvSpPr txBox="1"/>
+          <p:nvPr/>
+        </p:nvSpPr>
+        <p:spPr>
+          <a:xfrm>
+            <a:off x="2667002" y="2080167"/>
+            <a:ext cx="583663" cy="369332"/>
+          </a:xfrm>
+          <a:prstGeom prst="rect">
+            <a:avLst/>
+          </a:prstGeom>
+          <a:noFill/>
+        </p:spPr>
+        <p:txBody>
+          <a:bodyPr wrap="none" rtlCol="0">
+            <a:spAutoFit/>
+          </a:bodyPr>
+          <a:lstStyle/>
+          <a:p>
+            <a:r>
+              <a:rPr lang="en-US" dirty="0" smtClean="0"/>
+              <a:t>5cm</a:t>
+            </a:r>
+            <a:endParaRPr lang="en-US" dirty="0"/>
+          </a:p>
+        </p:txBody>
+      </p:sp>
+      <p:cxnSp>
+        <p:nvCxnSpPr>
+          <p:cNvPr id="19" name="Straight Arrow Connector 18"/>
+          <p:cNvCxnSpPr/>
+          <p:nvPr/>
+        </p:nvCxnSpPr>
+        <p:spPr>
+          <a:xfrm flipV="1">
+            <a:off x="3937672" y="2411399"/>
+            <a:ext cx="857249" cy="10583"/>
+          </a:xfrm>
+          <a:prstGeom prst="straightConnector1">
+            <a:avLst/>
+          </a:prstGeom>
+          <a:ln w="19050">
+            <a:solidFill>
+              <a:schemeClr val="tx1"/>
+            </a:solidFill>
+            <a:headEnd type="arrow"/>
+            <a:tailEnd type="arrow"/>
+          </a:ln>
+          <a:effectLst/>
+        </p:spPr>
+        <p:style>
+          <a:lnRef idx="2">
+            <a:schemeClr val="accent1"/>
+          </a:lnRef>
+          <a:fillRef idx="0">
+            <a:schemeClr val="accent1"/>
+          </a:fillRef>
+          <a:effectRef idx="1">
+            <a:schemeClr val="accent1"/>
+          </a:effectRef>
+          <a:fontRef idx="minor">
+            <a:schemeClr val="tx1"/>
+          </a:fontRef>
+        </p:style>
+      </p:cxnSp>
+      <p:sp>
+        <p:nvSpPr>
+          <p:cNvPr id="20" name="TextBox 19"/>
+          <p:cNvSpPr txBox="1"/>
+          <p:nvPr/>
+        </p:nvSpPr>
+        <p:spPr>
+          <a:xfrm>
+            <a:off x="4064672" y="2004483"/>
+            <a:ext cx="583663" cy="369332"/>
+          </a:xfrm>
+          <a:prstGeom prst="rect">
+            <a:avLst/>
+          </a:prstGeom>
+          <a:noFill/>
+        </p:spPr>
+        <p:txBody>
+          <a:bodyPr wrap="none" rtlCol="0">
+            <a:spAutoFit/>
+          </a:bodyPr>
+          <a:lstStyle/>
+          <a:p>
+            <a:r>
+              <a:rPr lang="en-US" dirty="0"/>
+              <a:t>2</a:t>
+            </a:r>
+            <a:r>
+              <a:rPr lang="en-US" dirty="0" smtClean="0"/>
+              <a:t>cm</a:t>
+            </a:r>
+            <a:endParaRPr lang="en-US" dirty="0"/>
+          </a:p>
+        </p:txBody>
+      </p:sp>
+      <p:cxnSp>
+        <p:nvCxnSpPr>
+          <p:cNvPr id="21" name="Straight Arrow Connector 20"/>
+          <p:cNvCxnSpPr/>
+          <p:nvPr/>
+        </p:nvCxnSpPr>
+        <p:spPr>
+          <a:xfrm flipH="1">
+            <a:off x="4921920" y="2566301"/>
+            <a:ext cx="1" cy="1280583"/>
+          </a:xfrm>
+          <a:prstGeom prst="straightConnector1">
+            <a:avLst/>
+          </a:prstGeom>
+          <a:ln w="19050">
+            <a:solidFill>
+              <a:schemeClr val="tx1"/>
+            </a:solidFill>
+            <a:headEnd type="arrow"/>
+            <a:tailEnd type="arrow"/>
+          </a:ln>
+          <a:effectLst/>
+        </p:spPr>
+        <p:style>
+          <a:lnRef idx="2">
+            <a:schemeClr val="accent1"/>
+          </a:lnRef>
+          <a:fillRef idx="0">
+            <a:schemeClr val="accent1"/>
+          </a:fillRef>
+          <a:effectRef idx="1">
+            <a:schemeClr val="accent1"/>
+          </a:effectRef>
+          <a:fontRef idx="minor">
+            <a:schemeClr val="tx1"/>
+          </a:fontRef>
+        </p:style>
+      </p:cxnSp>
+      <p:sp>
+        <p:nvSpPr>
+          <p:cNvPr id="22" name="TextBox 21"/>
+          <p:cNvSpPr txBox="1"/>
+          <p:nvPr/>
+        </p:nvSpPr>
+        <p:spPr>
+          <a:xfrm>
+            <a:off x="4921920" y="2924261"/>
+            <a:ext cx="583663" cy="369332"/>
+          </a:xfrm>
+          <a:prstGeom prst="rect">
+            <a:avLst/>
+          </a:prstGeom>
+          <a:noFill/>
+        </p:spPr>
+        <p:txBody>
+          <a:bodyPr wrap="none" rtlCol="0">
+            <a:spAutoFit/>
+          </a:bodyPr>
+          <a:lstStyle/>
+          <a:p>
+            <a:r>
+              <a:rPr lang="en-US" dirty="0"/>
+              <a:t>4</a:t>
+            </a:r>
+            <a:r>
+              <a:rPr lang="en-US" dirty="0" smtClean="0"/>
+              <a:t>cm</a:t>
+            </a:r>
+            <a:endParaRPr lang="en-US" dirty="0"/>
+          </a:p>
+        </p:txBody>
+      </p:sp>
+      <p:cxnSp>
+        <p:nvCxnSpPr>
+          <p:cNvPr id="26" name="Straight Arrow Connector 25"/>
+          <p:cNvCxnSpPr/>
+          <p:nvPr/>
+        </p:nvCxnSpPr>
+        <p:spPr>
+          <a:xfrm flipV="1">
+            <a:off x="6124657" y="2410313"/>
+            <a:ext cx="357960" cy="5292"/>
+          </a:xfrm>
+          <a:prstGeom prst="straightConnector1">
+            <a:avLst/>
+          </a:prstGeom>
+          <a:ln w="19050">
+            <a:solidFill>
+              <a:schemeClr val="tx1"/>
+            </a:solidFill>
+            <a:headEnd type="arrow"/>
+            <a:tailEnd type="arrow"/>
+          </a:ln>
+          <a:effectLst/>
+        </p:spPr>
+        <p:style>
+          <a:lnRef idx="2">
+            <a:schemeClr val="accent1"/>
+          </a:lnRef>
+          <a:fillRef idx="0">
+            <a:schemeClr val="accent1"/>
+          </a:fillRef>
+          <a:effectRef idx="1">
+            <a:schemeClr val="accent1"/>
+          </a:effectRef>
+          <a:fontRef idx="minor">
+            <a:schemeClr val="tx1"/>
+          </a:fontRef>
+        </p:style>
+      </p:cxnSp>
+      <p:sp>
+        <p:nvSpPr>
+          <p:cNvPr id="28" name="TextBox 27"/>
+          <p:cNvSpPr txBox="1"/>
+          <p:nvPr/>
+        </p:nvSpPr>
+        <p:spPr>
+          <a:xfrm>
+            <a:off x="6017557" y="1992814"/>
+            <a:ext cx="583663" cy="369332"/>
+          </a:xfrm>
+          <a:prstGeom prst="rect">
+            <a:avLst/>
+          </a:prstGeom>
+          <a:noFill/>
+        </p:spPr>
+        <p:txBody>
+          <a:bodyPr wrap="none" rtlCol="0">
+            <a:spAutoFit/>
+          </a:bodyPr>
+          <a:lstStyle/>
+          <a:p>
+            <a:r>
+              <a:rPr lang="en-US" dirty="0" smtClean="0"/>
+              <a:t>2cm</a:t>
+            </a:r>
+            <a:endParaRPr lang="en-US" dirty="0"/>
+          </a:p>
+        </p:txBody>
+      </p:sp>
+      <p:cxnSp>
+        <p:nvCxnSpPr>
+          <p:cNvPr id="30" name="Straight Arrow Connector 29"/>
+          <p:cNvCxnSpPr/>
+          <p:nvPr/>
+        </p:nvCxnSpPr>
+        <p:spPr>
+          <a:xfrm flipH="1">
+            <a:off x="6706530" y="2554632"/>
+            <a:ext cx="1" cy="357960"/>
+          </a:xfrm>
+          <a:prstGeom prst="straightConnector1">
+            <a:avLst/>
+          </a:prstGeom>
+          <a:ln w="19050">
+            <a:solidFill>
+              <a:schemeClr val="tx1"/>
+            </a:solidFill>
+            <a:headEnd type="arrow"/>
+            <a:tailEnd type="arrow"/>
+          </a:ln>
+          <a:effectLst/>
+        </p:spPr>
+        <p:style>
+          <a:lnRef idx="2">
+            <a:schemeClr val="accent1"/>
+          </a:lnRef>
+          <a:fillRef idx="0">
+            <a:schemeClr val="accent1"/>
+          </a:fillRef>
+          <a:effectRef idx="1">
+            <a:schemeClr val="accent1"/>
+          </a:effectRef>
+          <a:fontRef idx="minor">
+            <a:schemeClr val="tx1"/>
+          </a:fontRef>
+        </p:style>
+      </p:cxnSp>
+      <p:sp>
+        <p:nvSpPr>
+          <p:cNvPr id="31" name="TextBox 30"/>
+          <p:cNvSpPr txBox="1"/>
+          <p:nvPr/>
+        </p:nvSpPr>
+        <p:spPr>
+          <a:xfrm>
+            <a:off x="6775322" y="3354916"/>
+            <a:ext cx="583663" cy="369332"/>
+          </a:xfrm>
+          <a:prstGeom prst="rect">
+            <a:avLst/>
+          </a:prstGeom>
+          <a:noFill/>
+        </p:spPr>
+        <p:txBody>
+          <a:bodyPr wrap="none" rtlCol="0">
+            <a:spAutoFit/>
+          </a:bodyPr>
+          <a:lstStyle/>
+          <a:p>
+            <a:r>
+              <a:rPr lang="en-US" dirty="0" smtClean="0"/>
+              <a:t>3cm</a:t>
+            </a:r>
+            <a:endParaRPr lang="en-US" dirty="0"/>
+          </a:p>
+        </p:txBody>
+      </p:sp>
+      <p:cxnSp>
+        <p:nvCxnSpPr>
+          <p:cNvPr id="33" name="Straight Arrow Connector 32"/>
+          <p:cNvCxnSpPr/>
+          <p:nvPr/>
+        </p:nvCxnSpPr>
+        <p:spPr>
+          <a:xfrm>
+            <a:off x="6706530" y="2923964"/>
+            <a:ext cx="1" cy="1068015"/>
+          </a:xfrm>
+          <a:prstGeom prst="straightConnector1">
+            <a:avLst/>
+          </a:prstGeom>
+          <a:ln w="19050">
+            <a:solidFill>
+              <a:schemeClr val="tx1"/>
+            </a:solidFill>
+            <a:headEnd type="arrow"/>
+            <a:tailEnd type="arrow"/>
+          </a:ln>
+          <a:effectLst/>
+        </p:spPr>
+        <p:style>
+          <a:lnRef idx="2">
+            <a:schemeClr val="accent1"/>
+          </a:lnRef>
+          <a:fillRef idx="0">
+            <a:schemeClr val="accent1"/>
+          </a:fillRef>
+          <a:effectRef idx="1">
+            <a:schemeClr val="accent1"/>
+          </a:effectRef>
+          <a:fontRef idx="minor">
+            <a:schemeClr val="tx1"/>
+          </a:fontRef>
+        </p:style>
+      </p:cxnSp>
+      <p:sp>
+        <p:nvSpPr>
+          <p:cNvPr id="35" name="TextBox 34"/>
+          <p:cNvSpPr txBox="1"/>
+          <p:nvPr/>
+        </p:nvSpPr>
+        <p:spPr>
+          <a:xfrm>
+            <a:off x="6775322" y="2558682"/>
+            <a:ext cx="583663" cy="369332"/>
+          </a:xfrm>
+          <a:prstGeom prst="rect">
+            <a:avLst/>
+          </a:prstGeom>
+          <a:noFill/>
+        </p:spPr>
+        <p:txBody>
+          <a:bodyPr wrap="none" rtlCol="0">
+            <a:spAutoFit/>
+          </a:bodyPr>
+          <a:lstStyle/>
+          <a:p>
+            <a:r>
+              <a:rPr lang="en-US" dirty="0" smtClean="0"/>
+              <a:t>1cm</a:t>
+            </a:r>
+            <a:endParaRPr lang="en-US" dirty="0"/>
+          </a:p>
+        </p:txBody>
+      </p:sp>
+      <p:sp>
+        <p:nvSpPr>
+          <p:cNvPr id="36" name="TextBox 35"/>
+          <p:cNvSpPr txBox="1"/>
+          <p:nvPr/>
+        </p:nvSpPr>
+        <p:spPr>
+          <a:xfrm>
+            <a:off x="486833" y="1759064"/>
+            <a:ext cx="1035109" cy="276999"/>
+          </a:xfrm>
+          <a:prstGeom prst="rect">
+            <a:avLst/>
+          </a:prstGeom>
+          <a:noFill/>
+        </p:spPr>
+        <p:txBody>
+          <a:bodyPr wrap="none" rtlCol="0">
+            <a:spAutoFit/>
+          </a:bodyPr>
+          <a:lstStyle/>
+          <a:p>
+            <a:r>
+              <a:rPr lang="en-US" sz="1200" dirty="0" smtClean="0">
+                <a:latin typeface="Times New Roman"/>
+                <a:cs typeface="Times New Roman"/>
+              </a:rPr>
+              <a:t>* Not to scale</a:t>
+            </a:r>
+            <a:endParaRPr lang="en-US" sz="1200" dirty="0">
+              <a:latin typeface="Times New Roman"/>
+              <a:cs typeface="Times New Roman"/>
+            </a:endParaRPr>
+          </a:p>
+        </p:txBody>
+      </p:sp>
+      <p:sp>
+        <p:nvSpPr>
+          <p:cNvPr id="37" name="Rectangle 36"/>
+          <p:cNvSpPr/>
+          <p:nvPr/>
+        </p:nvSpPr>
+        <p:spPr>
+          <a:xfrm>
+            <a:off x="486833" y="1746250"/>
+            <a:ext cx="7122584" cy="2899833"/>
+          </a:xfrm>
+          <a:prstGeom prst="rect">
+            <a:avLst/>
+          </a:prstGeom>
+          <a:noFill/>
+          <a:ln>
+            <a:solidFill>
+              <a:schemeClr val="tx1"/>
+            </a:solidFill>
+          </a:ln>
+          <a:effectLst/>
+        </p:spPr>
+        <p:style>
+          <a:lnRef idx="1">
+            <a:schemeClr val="accent1"/>
+          </a:lnRef>
+          <a:fillRef idx="3">
+            <a:schemeClr val="accent1"/>
+          </a:fillRef>
+          <a:effectRef idx="2">
+            <a:schemeClr val="accent1"/>
+          </a:effectRef>
+          <a:fontRef idx="minor">
+            <a:schemeClr val="lt1"/>
+          </a:fontRef>
+        </p:style>
+        <p:txBody>
+          <a:bodyPr rtlCol="0" anchor="ctr"/>
+          <a:lstStyle/>
+          <a:p>
+            <a:pPr algn="ctr"/>
+            <a:endParaRPr lang="en-US"/>
+          </a:p>
+        </p:txBody>
+      </p:sp>
+    </p:spTree>
+    <p:extLst>
+      <p:ext uri="{BB962C8B-B14F-4D97-AF65-F5344CB8AC3E}">
+        <p14:creationId xmlns:p14="http://schemas.microsoft.com/office/powerpoint/2010/main" val="1940187858"/>
+      </p:ext>
+    </p:extLst>
+  </p:cSld>
+  <p:clrMapOvr>
+    <a:masterClrMapping/>
+  </p:clrMapOvr>
+</p:sld>
+</file>
+
+<file path=ppt/slides/slide5.xml><?xml version="1.0" encoding="utf-8"?>
+<p:sld xmlns:a="http://schemas.openxmlformats.org/drawingml/2006/main" xmlns:r="http://schemas.openxmlformats.org/officeDocument/2006/relationships" xmlns:p="http://schemas.openxmlformats.org/presentationml/2006/main">
+  <p:cSld>
+    <p:spTree>
+      <p:nvGrpSpPr>
+        <p:cNvPr id="1" name=""/>
+        <p:cNvGrpSpPr/>
+        <p:nvPr/>
+      </p:nvGrpSpPr>
+      <p:grpSpPr>
+        <a:xfrm>
+          <a:off x="0" y="0"/>
+          <a:ext cx="0" cy="0"/>
+          <a:chOff x="0" y="0"/>
+          <a:chExt cx="0" cy="0"/>
+        </a:xfrm>
+      </p:grpSpPr>
+      <p:pic>
+        <p:nvPicPr>
+          <p:cNvPr id="5" name="Picture 4"/>
+          <p:cNvPicPr>
+            <a:picLocks noChangeAspect="1"/>
+          </p:cNvPicPr>
+          <p:nvPr/>
+        </p:nvPicPr>
+        <p:blipFill>
+          <a:blip r:embed="rId2"/>
+          <a:stretch>
+            <a:fillRect/>
+          </a:stretch>
+        </p:blipFill>
+        <p:spPr>
+          <a:xfrm>
+            <a:off x="1375833" y="1680634"/>
+            <a:ext cx="5810250" cy="3792898"/>
+          </a:xfrm>
+          <a:prstGeom prst="rect">
+            <a:avLst/>
+          </a:prstGeom>
+        </p:spPr>
+      </p:pic>
+    </p:spTree>
+    <p:extLst>
+      <p:ext uri="{BB962C8B-B14F-4D97-AF65-F5344CB8AC3E}">
+        <p14:creationId xmlns:p14="http://schemas.microsoft.com/office/powerpoint/2010/main" val="730076902"/>
       </p:ext>
     </p:extLst>
   </p:cSld>

</xml_diff>